<commit_message>
Add the basic OS commands.
</commit_message>
<xml_diff>
--- a/docs/LearnToCodeWithPython.pptx
+++ b/docs/LearnToCodeWithPython.pptx
@@ -593,7 +593,7 @@
           <a:p>
             <a:fld id="{01EE5341-7E5B-41C1-B9CB-15573F58ADAA}" type="datetimeFigureOut">
               <a:rPr lang="en-US" smtClean="0"/>
-              <a:t>11/5/19</a:t>
+              <a:t>11/9/19</a:t>
             </a:fld>
             <a:endParaRPr lang="en-US"/>
           </a:p>
@@ -1029,7 +1029,7 @@
           <a:p>
             <a:fld id="{E3CD405B-7375-CC4C-A138-0EBABEC69649}" type="datetime1">
               <a:rPr lang="en-US" smtClean="0"/>
-              <a:t>11/5/19</a:t>
+              <a:t>11/9/19</a:t>
             </a:fld>
             <a:endParaRPr lang="en-US" dirty="0"/>
           </a:p>
@@ -1324,7 +1324,7 @@
           <a:p>
             <a:fld id="{64E5F77A-981E-4247-B5BD-C3F8F3CCD618}" type="datetime1">
               <a:rPr lang="en-US" smtClean="0"/>
-              <a:t>11/5/19</a:t>
+              <a:t>11/9/19</a:t>
             </a:fld>
             <a:endParaRPr lang="en-US" dirty="0"/>
           </a:p>
@@ -1579,7 +1579,7 @@
           <a:p>
             <a:fld id="{55B5331B-623E-9742-B679-AFB953F46C97}" type="datetime1">
               <a:rPr lang="en-US" smtClean="0"/>
-              <a:t>11/5/19</a:t>
+              <a:t>11/9/19</a:t>
             </a:fld>
             <a:endParaRPr lang="en-US" dirty="0"/>
           </a:p>
@@ -1808,7 +1808,7 @@
           <a:p>
             <a:fld id="{408CCCB6-DE8E-9642-BA0B-0ED86D18D9A7}" type="datetime1">
               <a:rPr lang="en-US" smtClean="0"/>
-              <a:t>11/5/19</a:t>
+              <a:t>11/9/19</a:t>
             </a:fld>
             <a:endParaRPr lang="en-US" dirty="0"/>
           </a:p>
@@ -2146,7 +2146,7 @@
           <a:p>
             <a:fld id="{7F7AF3B8-D719-CF4B-BA3F-F53A0980AE0E}" type="datetime1">
               <a:rPr lang="en-US" smtClean="0"/>
-              <a:t>11/5/19</a:t>
+              <a:t>11/9/19</a:t>
             </a:fld>
             <a:endParaRPr lang="en-US" dirty="0"/>
           </a:p>
@@ -2647,7 +2647,7 @@
           <a:p>
             <a:fld id="{12EDD441-921C-DC41-AFDE-A7239B371DB0}" type="datetime1">
               <a:rPr lang="en-US" smtClean="0"/>
-              <a:t>11/5/19</a:t>
+              <a:t>11/9/19</a:t>
             </a:fld>
             <a:endParaRPr lang="en-US" dirty="0"/>
           </a:p>
@@ -3226,7 +3226,7 @@
           <a:p>
             <a:fld id="{9B675FC2-3481-2D49-BFD6-33B8BAC0140D}" type="datetime1">
               <a:rPr lang="en-US" smtClean="0"/>
-              <a:t>11/5/19</a:t>
+              <a:t>11/9/19</a:t>
             </a:fld>
             <a:endParaRPr lang="en-US" dirty="0"/>
           </a:p>
@@ -4002,7 +4002,7 @@
           <a:p>
             <a:fld id="{B5F135CF-A98F-4B42-BEE5-C55FC59B6037}" type="datetime1">
               <a:rPr lang="en-US" smtClean="0"/>
-              <a:t>11/5/19</a:t>
+              <a:t>11/9/19</a:t>
             </a:fld>
             <a:endParaRPr lang="en-US" dirty="0"/>
           </a:p>
@@ -4179,7 +4179,7 @@
           <a:p>
             <a:fld id="{0DCC65CF-F52A-834A-A9FA-2DF6B6EDB688}" type="datetime1">
               <a:rPr lang="en-US" smtClean="0"/>
-              <a:t>11/5/19</a:t>
+              <a:t>11/9/19</a:t>
             </a:fld>
             <a:endParaRPr lang="en-US" dirty="0"/>
           </a:p>
@@ -4400,7 +4400,7 @@
           <a:p>
             <a:fld id="{89A74804-87BD-E44C-ABDC-0EED3DE0DD3C}" type="datetime1">
               <a:rPr lang="en-US" smtClean="0"/>
-              <a:t>11/5/19</a:t>
+              <a:t>11/9/19</a:t>
             </a:fld>
             <a:endParaRPr lang="en-US" dirty="0"/>
           </a:p>
@@ -4612,7 +4612,7 @@
           <a:p>
             <a:fld id="{F41C90BC-BB19-D143-A85E-83FF99B72C97}" type="datetime1">
               <a:rPr lang="en-US" smtClean="0"/>
-              <a:t>11/5/19</a:t>
+              <a:t>11/9/19</a:t>
             </a:fld>
             <a:endParaRPr lang="en-US" dirty="0"/>
           </a:p>
@@ -4762,7 +4762,7 @@
           <a:p>
             <a:fld id="{F41C90BC-BB19-D143-A85E-83FF99B72C97}" type="datetime1">
               <a:rPr lang="en-US" smtClean="0"/>
-              <a:t>11/5/19</a:t>
+              <a:t>11/9/19</a:t>
             </a:fld>
             <a:endParaRPr lang="en-US" dirty="0"/>
           </a:p>
@@ -5054,7 +5054,7 @@
           <a:p>
             <a:fld id="{D8CFB387-4E35-DD48-898A-F982CA0031A4}" type="datetime1">
               <a:rPr lang="en-US" smtClean="0"/>
-              <a:t>11/5/19</a:t>
+              <a:t>11/9/19</a:t>
             </a:fld>
             <a:endParaRPr lang="en-US" dirty="0"/>
           </a:p>
@@ -5328,7 +5328,7 @@
           <a:p>
             <a:fld id="{A9612CB7-477C-0042-9441-735E48010D63}" type="datetime1">
               <a:rPr lang="en-US" smtClean="0"/>
-              <a:t>11/5/19</a:t>
+              <a:t>11/9/19</a:t>
             </a:fld>
             <a:endParaRPr lang="en-US" dirty="0"/>
           </a:p>
@@ -5709,7 +5709,7 @@
           <a:p>
             <a:fld id="{CCEA47EE-37C6-FA43-9967-E95355300FBF}" type="datetime1">
               <a:rPr lang="en-US" smtClean="0"/>
-              <a:t>11/5/19</a:t>
+              <a:t>11/9/19</a:t>
             </a:fld>
             <a:endParaRPr lang="en-US" dirty="0"/>
           </a:p>
@@ -5829,7 +5829,7 @@
           <a:p>
             <a:fld id="{36871B0A-214C-2249-BC7B-D21B5302063E}" type="datetime1">
               <a:rPr lang="en-US" smtClean="0"/>
-              <a:t>11/5/19</a:t>
+              <a:t>11/9/19</a:t>
             </a:fld>
             <a:endParaRPr lang="en-US" dirty="0"/>
           </a:p>
@@ -5923,7 +5923,7 @@
           <a:p>
             <a:fld id="{88F99F24-CD42-4C4C-BDDC-852586384225}" type="datetime1">
               <a:rPr lang="en-US" smtClean="0"/>
-              <a:t>11/5/19</a:t>
+              <a:t>11/9/19</a:t>
             </a:fld>
             <a:endParaRPr lang="en-US" dirty="0"/>
           </a:p>
@@ -6170,7 +6170,7 @@
           <a:p>
             <a:fld id="{817E9D72-29BF-0B4C-A0B2-E34C6CDF9F19}" type="datetime1">
               <a:rPr lang="en-US" smtClean="0"/>
-              <a:t>11/5/19</a:t>
+              <a:t>11/9/19</a:t>
             </a:fld>
             <a:endParaRPr lang="en-US" dirty="0"/>
           </a:p>
@@ -6411,7 +6411,7 @@
           <a:p>
             <a:fld id="{8C3C5BEC-7CF4-1E4F-91F7-7EE45DB1A96A}" type="datetime1">
               <a:rPr lang="en-US" smtClean="0"/>
-              <a:t>11/5/19</a:t>
+              <a:t>11/9/19</a:t>
             </a:fld>
             <a:endParaRPr lang="en-US" dirty="0"/>
           </a:p>
@@ -7091,7 +7091,7 @@
           <a:p>
             <a:fld id="{E2238D40-BA6D-2746-9BD0-E4CA68AE0811}" type="datetime1">
               <a:rPr lang="en-US" smtClean="0"/>
-              <a:t>11/5/19</a:t>
+              <a:t>11/9/19</a:t>
             </a:fld>
             <a:endParaRPr lang="en-US" dirty="0"/>
           </a:p>
@@ -7434,7 +7434,7 @@
           <a:p>
             <a:fld id="{F41C90BC-BB19-D143-A85E-83FF99B72C97}" type="datetime1">
               <a:rPr lang="en-US" smtClean="0"/>
-              <a:t>11/5/19</a:t>
+              <a:t>11/9/19</a:t>
             </a:fld>
             <a:endParaRPr lang="en-US" dirty="0"/>
           </a:p>
@@ -7604,7 +7604,7 @@
           <a:p>
             <a:fld id="{F41C90BC-BB19-D143-A85E-83FF99B72C97}" type="datetime1">
               <a:rPr lang="en-US" smtClean="0"/>
-              <a:t>11/5/19</a:t>
+              <a:t>11/9/19</a:t>
             </a:fld>
             <a:endParaRPr lang="en-US" dirty="0"/>
           </a:p>
@@ -8423,7 +8423,7 @@
           <a:p>
             <a:fld id="{D8CFB387-4E35-DD48-898A-F982CA0031A4}" type="datetime1">
               <a:rPr lang="en-US" smtClean="0"/>
-              <a:t>11/5/19</a:t>
+              <a:t>11/9/19</a:t>
             </a:fld>
             <a:endParaRPr lang="en-US" dirty="0"/>
           </a:p>
@@ -8607,7 +8607,7 @@
           <a:p>
             <a:fld id="{F41C90BC-BB19-D143-A85E-83FF99B72C97}" type="datetime1">
               <a:rPr lang="en-US" smtClean="0"/>
-              <a:t>11/5/19</a:t>
+              <a:t>11/9/19</a:t>
             </a:fld>
             <a:endParaRPr lang="en-US" dirty="0"/>
           </a:p>
@@ -8791,7 +8791,7 @@
           <a:p>
             <a:fld id="{F41C90BC-BB19-D143-A85E-83FF99B72C97}" type="datetime1">
               <a:rPr lang="en-US" smtClean="0"/>
-              <a:t>11/5/19</a:t>
+              <a:t>11/9/19</a:t>
             </a:fld>
             <a:endParaRPr lang="en-US" dirty="0"/>
           </a:p>
@@ -9031,7 +9031,7 @@
           <a:p>
             <a:fld id="{F41C90BC-BB19-D143-A85E-83FF99B72C97}" type="datetime1">
               <a:rPr lang="en-US" smtClean="0"/>
-              <a:t>11/5/19</a:t>
+              <a:t>11/9/19</a:t>
             </a:fld>
             <a:endParaRPr lang="en-US" dirty="0"/>
           </a:p>
@@ -9245,7 +9245,7 @@
           <a:p>
             <a:fld id="{F41C90BC-BB19-D143-A85E-83FF99B72C97}" type="datetime1">
               <a:rPr lang="en-US" smtClean="0"/>
-              <a:t>11/5/19</a:t>
+              <a:t>11/9/19</a:t>
             </a:fld>
             <a:endParaRPr lang="en-US" dirty="0"/>
           </a:p>
@@ -9483,7 +9483,7 @@
           <a:p>
             <a:fld id="{F41C90BC-BB19-D143-A85E-83FF99B72C97}" type="datetime1">
               <a:rPr lang="en-US" smtClean="0"/>
-              <a:t>11/5/19</a:t>
+              <a:t>11/9/19</a:t>
             </a:fld>
             <a:endParaRPr lang="en-US" dirty="0"/>
           </a:p>
@@ -9726,7 +9726,7 @@
           <a:p>
             <a:fld id="{F41C90BC-BB19-D143-A85E-83FF99B72C97}" type="datetime1">
               <a:rPr lang="en-US" smtClean="0"/>
-              <a:t>11/5/19</a:t>
+              <a:t>11/9/19</a:t>
             </a:fld>
             <a:endParaRPr lang="en-US" dirty="0"/>
           </a:p>
@@ -9896,7 +9896,7 @@
           <a:p>
             <a:fld id="{D8CFB387-4E35-DD48-898A-F982CA0031A4}" type="datetime1">
               <a:rPr lang="en-US" smtClean="0"/>
-              <a:t>11/5/19</a:t>
+              <a:t>11/9/19</a:t>
             </a:fld>
             <a:endParaRPr lang="en-US" dirty="0"/>
           </a:p>
@@ -10144,7 +10144,7 @@
           <a:p>
             <a:fld id="{FCEF5CFF-C6A4-D749-9A04-F6B0D10B0E2A}" type="datetime1">
               <a:rPr lang="en-US" smtClean="0"/>
-              <a:t>11/5/19</a:t>
+              <a:t>11/9/19</a:t>
             </a:fld>
             <a:endParaRPr lang="en-US" dirty="0"/>
           </a:p>
@@ -10379,7 +10379,7 @@
           <a:p>
             <a:fld id="{F41C90BC-BB19-D143-A85E-83FF99B72C97}" type="datetime1">
               <a:rPr lang="en-US" smtClean="0"/>
-              <a:t>11/5/19</a:t>
+              <a:t>11/9/19</a:t>
             </a:fld>
             <a:endParaRPr lang="en-US" dirty="0"/>
           </a:p>
@@ -10583,7 +10583,7 @@
           <a:p>
             <a:fld id="{F41C90BC-BB19-D143-A85E-83FF99B72C97}" type="datetime1">
               <a:rPr lang="en-US" smtClean="0"/>
-              <a:t>11/5/19</a:t>
+              <a:t>11/9/19</a:t>
             </a:fld>
             <a:endParaRPr lang="en-US" dirty="0"/>
           </a:p>
@@ -10771,7 +10771,7 @@
           <a:p>
             <a:fld id="{F41C90BC-BB19-D143-A85E-83FF99B72C97}" type="datetime1">
               <a:rPr lang="en-US" smtClean="0"/>
-              <a:t>11/5/19</a:t>
+              <a:t>11/9/19</a:t>
             </a:fld>
             <a:endParaRPr lang="en-US" dirty="0"/>
           </a:p>
@@ -10968,7 +10968,7 @@
           <a:p>
             <a:fld id="{F41C90BC-BB19-D143-A85E-83FF99B72C97}" type="datetime1">
               <a:rPr lang="en-US" smtClean="0"/>
-              <a:t>11/5/19</a:t>
+              <a:t>11/9/19</a:t>
             </a:fld>
             <a:endParaRPr lang="en-US" dirty="0"/>
           </a:p>
@@ -11229,7 +11229,7 @@
           <a:p>
             <a:fld id="{F41C90BC-BB19-D143-A85E-83FF99B72C97}" type="datetime1">
               <a:rPr lang="en-US" smtClean="0"/>
-              <a:t>11/5/19</a:t>
+              <a:t>11/9/19</a:t>
             </a:fld>
             <a:endParaRPr lang="en-US" dirty="0"/>
           </a:p>
@@ -11459,7 +11459,7 @@
                 <a:tabLst/>
                 <a:defRPr/>
               </a:pPr>
-              <a:t>11/5/19</a:t>
+              <a:t>11/9/19</a:t>
             </a:fld>
             <a:endParaRPr kumimoji="0" lang="en-US" sz="1050" b="0" i="0" u="none" strike="noStrike" kern="1200" cap="none" spc="0" normalizeH="0" baseline="0" noProof="0" dirty="0">
               <a:ln>
@@ -11827,7 +11827,7 @@
           <a:p>
             <a:fld id="{F41C90BC-BB19-D143-A85E-83FF99B72C97}" type="datetime1">
               <a:rPr lang="en-US" smtClean="0"/>
-              <a:t>11/5/19</a:t>
+              <a:t>11/9/19</a:t>
             </a:fld>
             <a:endParaRPr lang="en-US" dirty="0"/>
           </a:p>
@@ -12028,7 +12028,7 @@
           <a:p>
             <a:fld id="{F41C90BC-BB19-D143-A85E-83FF99B72C97}" type="datetime1">
               <a:rPr lang="en-US" smtClean="0"/>
-              <a:t>11/5/19</a:t>
+              <a:t>11/9/19</a:t>
             </a:fld>
             <a:endParaRPr lang="en-US" dirty="0"/>
           </a:p>
@@ -12916,7 +12916,7 @@
           <a:p>
             <a:fld id="{F41C90BC-BB19-D143-A85E-83FF99B72C97}" type="datetime1">
               <a:rPr lang="en-US" smtClean="0"/>
-              <a:t>11/5/19</a:t>
+              <a:t>11/9/19</a:t>
             </a:fld>
             <a:endParaRPr lang="en-US" dirty="0"/>
           </a:p>
@@ -13114,7 +13114,7 @@
           <a:p>
             <a:fld id="{D8CFB387-4E35-DD48-898A-F982CA0031A4}" type="datetime1">
               <a:rPr lang="en-US" smtClean="0"/>
-              <a:t>11/5/19</a:t>
+              <a:t>11/9/19</a:t>
             </a:fld>
             <a:endParaRPr lang="en-US" dirty="0"/>
           </a:p>
@@ -13311,7 +13311,7 @@
           <a:p>
             <a:fld id="{C4EFEBDD-6C14-AC48-8F37-750798585A2A}" type="datetime1">
               <a:rPr lang="en-US" smtClean="0"/>
-              <a:t>11/5/19</a:t>
+              <a:t>11/9/19</a:t>
             </a:fld>
             <a:endParaRPr lang="en-US" dirty="0"/>
           </a:p>
@@ -13697,7 +13697,7 @@
           <a:p>
             <a:fld id="{F41C90BC-BB19-D143-A85E-83FF99B72C97}" type="datetime1">
               <a:rPr lang="en-US" smtClean="0"/>
-              <a:t>11/5/19</a:t>
+              <a:t>11/9/19</a:t>
             </a:fld>
             <a:endParaRPr lang="en-US" dirty="0"/>
           </a:p>
@@ -13916,7 +13916,7 @@
           <a:p>
             <a:fld id="{F41C90BC-BB19-D143-A85E-83FF99B72C97}" type="datetime1">
               <a:rPr lang="en-US" smtClean="0"/>
-              <a:t>11/5/19</a:t>
+              <a:t>11/9/19</a:t>
             </a:fld>
             <a:endParaRPr lang="en-US" dirty="0"/>
           </a:p>
@@ -14187,7 +14187,7 @@
           <a:p>
             <a:fld id="{F41C90BC-BB19-D143-A85E-83FF99B72C97}" type="datetime1">
               <a:rPr lang="en-US" smtClean="0"/>
-              <a:t>11/5/19</a:t>
+              <a:t>11/9/19</a:t>
             </a:fld>
             <a:endParaRPr lang="en-US" dirty="0"/>
           </a:p>
@@ -14407,7 +14407,7 @@
           <a:p>
             <a:fld id="{F41C90BC-BB19-D143-A85E-83FF99B72C97}" type="datetime1">
               <a:rPr lang="en-US" smtClean="0"/>
-              <a:t>11/5/19</a:t>
+              <a:t>11/9/19</a:t>
             </a:fld>
             <a:endParaRPr lang="en-US" dirty="0"/>
           </a:p>
@@ -14621,7 +14621,7 @@
           <a:p>
             <a:fld id="{F41C90BC-BB19-D143-A85E-83FF99B72C97}" type="datetime1">
               <a:rPr lang="en-US" smtClean="0"/>
-              <a:t>11/5/19</a:t>
+              <a:t>11/9/19</a:t>
             </a:fld>
             <a:endParaRPr lang="en-US" dirty="0"/>
           </a:p>
@@ -14881,7 +14881,7 @@
           <a:p>
             <a:fld id="{F41C90BC-BB19-D143-A85E-83FF99B72C97}" type="datetime1">
               <a:rPr lang="en-US" smtClean="0"/>
-              <a:t>11/5/19</a:t>
+              <a:t>11/9/19</a:t>
             </a:fld>
             <a:endParaRPr lang="en-US" dirty="0"/>
           </a:p>
@@ -15135,7 +15135,7 @@
           <a:p>
             <a:fld id="{F41C90BC-BB19-D143-A85E-83FF99B72C97}" type="datetime1">
               <a:rPr lang="en-US" smtClean="0"/>
-              <a:t>11/5/19</a:t>
+              <a:t>11/9/19</a:t>
             </a:fld>
             <a:endParaRPr lang="en-US" dirty="0"/>
           </a:p>
@@ -15395,7 +15395,7 @@
           <a:p>
             <a:fld id="{F41C90BC-BB19-D143-A85E-83FF99B72C97}" type="datetime1">
               <a:rPr lang="en-US" smtClean="0"/>
-              <a:t>11/5/19</a:t>
+              <a:t>11/9/19</a:t>
             </a:fld>
             <a:endParaRPr lang="en-US" dirty="0"/>
           </a:p>
@@ -15693,7 +15693,7 @@
           <a:p>
             <a:fld id="{F41C90BC-BB19-D143-A85E-83FF99B72C97}" type="datetime1">
               <a:rPr lang="en-US" smtClean="0"/>
-              <a:t>11/5/19</a:t>
+              <a:t>11/9/19</a:t>
             </a:fld>
             <a:endParaRPr lang="en-US" dirty="0"/>
           </a:p>
@@ -15988,7 +15988,7 @@
           <a:p>
             <a:fld id="{F41C90BC-BB19-D143-A85E-83FF99B72C97}" type="datetime1">
               <a:rPr lang="en-US" smtClean="0"/>
-              <a:t>11/5/19</a:t>
+              <a:t>11/9/19</a:t>
             </a:fld>
             <a:endParaRPr lang="en-US" dirty="0"/>
           </a:p>
@@ -16209,7 +16209,7 @@
           <a:p>
             <a:fld id="{3A4758F3-81C1-8844-8B63-646C7EBCC899}" type="datetime1">
               <a:rPr lang="en-US" smtClean="0"/>
-              <a:t>11/5/19</a:t>
+              <a:t>11/9/19</a:t>
             </a:fld>
             <a:endParaRPr lang="en-US" dirty="0"/>
           </a:p>
@@ -16774,7 +16774,7 @@
           <a:p>
             <a:fld id="{F41C90BC-BB19-D143-A85E-83FF99B72C97}" type="datetime1">
               <a:rPr lang="en-US" smtClean="0"/>
-              <a:t>11/5/19</a:t>
+              <a:t>11/9/19</a:t>
             </a:fld>
             <a:endParaRPr lang="en-US" dirty="0"/>
           </a:p>
@@ -17050,7 +17050,7 @@
           <a:p>
             <a:fld id="{F41C90BC-BB19-D143-A85E-83FF99B72C97}" type="datetime1">
               <a:rPr lang="en-US" smtClean="0"/>
-              <a:t>11/5/19</a:t>
+              <a:t>11/9/19</a:t>
             </a:fld>
             <a:endParaRPr lang="en-US" dirty="0"/>
           </a:p>
@@ -17254,7 +17254,7 @@
           <a:p>
             <a:fld id="{F41C90BC-BB19-D143-A85E-83FF99B72C97}" type="datetime1">
               <a:rPr lang="en-US" smtClean="0"/>
-              <a:t>11/5/19</a:t>
+              <a:t>11/9/19</a:t>
             </a:fld>
             <a:endParaRPr lang="en-US" dirty="0"/>
           </a:p>
@@ -17486,7 +17486,7 @@
           <a:p>
             <a:fld id="{F41C90BC-BB19-D143-A85E-83FF99B72C97}" type="datetime1">
               <a:rPr lang="en-US" smtClean="0"/>
-              <a:t>11/5/19</a:t>
+              <a:t>11/9/19</a:t>
             </a:fld>
             <a:endParaRPr lang="en-US" dirty="0"/>
           </a:p>
@@ -17742,7 +17742,7 @@
           <a:p>
             <a:fld id="{F41C90BC-BB19-D143-A85E-83FF99B72C97}" type="datetime1">
               <a:rPr lang="en-US" smtClean="0"/>
-              <a:t>11/5/19</a:t>
+              <a:t>11/9/19</a:t>
             </a:fld>
             <a:endParaRPr lang="en-US" dirty="0"/>
           </a:p>
@@ -17915,7 +17915,7 @@
           <a:p>
             <a:fld id="{F41C90BC-BB19-D143-A85E-83FF99B72C97}" type="datetime1">
               <a:rPr lang="en-US" smtClean="0"/>
-              <a:t>11/5/19</a:t>
+              <a:t>11/9/19</a:t>
             </a:fld>
             <a:endParaRPr lang="en-US" dirty="0"/>
           </a:p>
@@ -18119,7 +18119,7 @@
           <a:p>
             <a:fld id="{D8497C9F-1E37-4843-AA35-A32C0A3B8474}" type="datetime1">
               <a:rPr lang="en-US" smtClean="0"/>
-              <a:t>11/5/19</a:t>
+              <a:t>11/9/19</a:t>
             </a:fld>
             <a:endParaRPr lang="en-US" dirty="0"/>
           </a:p>
@@ -18289,7 +18289,7 @@
           <a:p>
             <a:fld id="{D8CFB387-4E35-DD48-898A-F982CA0031A4}" type="datetime1">
               <a:rPr lang="en-US" smtClean="0"/>
-              <a:t>11/5/19</a:t>
+              <a:t>11/9/19</a:t>
             </a:fld>
             <a:endParaRPr lang="en-US" dirty="0"/>
           </a:p>
@@ -18602,7 +18602,7 @@
           <a:p>
             <a:fld id="{F41C90BC-BB19-D143-A85E-83FF99B72C97}" type="datetime1">
               <a:rPr lang="en-US" smtClean="0"/>
-              <a:t>11/5/19</a:t>
+              <a:t>11/9/19</a:t>
             </a:fld>
             <a:endParaRPr lang="en-US" dirty="0"/>
           </a:p>
@@ -18772,7 +18772,7 @@
           <a:p>
             <a:fld id="{D8CFB387-4E35-DD48-898A-F982CA0031A4}" type="datetime1">
               <a:rPr lang="en-US" smtClean="0"/>
-              <a:t>11/5/19</a:t>
+              <a:t>11/9/19</a:t>
             </a:fld>
             <a:endParaRPr lang="en-US" dirty="0"/>
           </a:p>
@@ -18955,7 +18955,7 @@
           <a:p>
             <a:fld id="{F41C90BC-BB19-D143-A85E-83FF99B72C97}" type="datetime1">
               <a:rPr lang="en-US" smtClean="0"/>
-              <a:t>11/5/19</a:t>
+              <a:t>11/9/19</a:t>
             </a:fld>
             <a:endParaRPr lang="en-US" dirty="0"/>
           </a:p>
@@ -19187,7 +19187,7 @@
           <a:p>
             <a:fld id="{F41C90BC-BB19-D143-A85E-83FF99B72C97}" type="datetime1">
               <a:rPr lang="en-US" smtClean="0"/>
-              <a:t>11/5/19</a:t>
+              <a:t>11/9/19</a:t>
             </a:fld>
             <a:endParaRPr lang="en-US" dirty="0"/>
           </a:p>
@@ -19461,7 +19461,7 @@
           <a:p>
             <a:fld id="{F41C90BC-BB19-D143-A85E-83FF99B72C97}" type="datetime1">
               <a:rPr lang="en-US" smtClean="0"/>
-              <a:t>11/5/19</a:t>
+              <a:t>11/9/19</a:t>
             </a:fld>
             <a:endParaRPr lang="en-US" dirty="0"/>
           </a:p>
@@ -19702,7 +19702,7 @@
           <a:p>
             <a:fld id="{F41C90BC-BB19-D143-A85E-83FF99B72C97}" type="datetime1">
               <a:rPr lang="en-US" smtClean="0"/>
-              <a:t>11/5/19</a:t>
+              <a:t>11/9/19</a:t>
             </a:fld>
             <a:endParaRPr lang="en-US" dirty="0"/>
           </a:p>
@@ -19951,7 +19951,7 @@
           <a:p>
             <a:fld id="{F41C90BC-BB19-D143-A85E-83FF99B72C97}" type="datetime1">
               <a:rPr lang="en-US" smtClean="0"/>
-              <a:t>11/5/19</a:t>
+              <a:t>11/9/19</a:t>
             </a:fld>
             <a:endParaRPr lang="en-US" dirty="0"/>
           </a:p>
@@ -20222,7 +20222,7 @@
           <a:p>
             <a:fld id="{F41C90BC-BB19-D143-A85E-83FF99B72C97}" type="datetime1">
               <a:rPr lang="en-US" smtClean="0"/>
-              <a:t>11/5/19</a:t>
+              <a:t>11/9/19</a:t>
             </a:fld>
             <a:endParaRPr lang="en-US" dirty="0"/>
           </a:p>
@@ -20425,7 +20425,7 @@
           <a:p>
             <a:fld id="{F41C90BC-BB19-D143-A85E-83FF99B72C97}" type="datetime1">
               <a:rPr lang="en-US" smtClean="0"/>
-              <a:t>11/5/19</a:t>
+              <a:t>11/9/19</a:t>
             </a:fld>
             <a:endParaRPr lang="en-US" dirty="0"/>
           </a:p>
@@ -20846,7 +20846,7 @@
           <a:p>
             <a:fld id="{F41C90BC-BB19-D143-A85E-83FF99B72C97}" type="datetime1">
               <a:rPr lang="en-US" smtClean="0"/>
-              <a:t>11/5/19</a:t>
+              <a:t>11/9/19</a:t>
             </a:fld>
             <a:endParaRPr lang="en-US" dirty="0"/>
           </a:p>
@@ -21097,7 +21097,7 @@
           <a:p>
             <a:fld id="{F41C90BC-BB19-D143-A85E-83FF99B72C97}" type="datetime1">
               <a:rPr lang="en-US" smtClean="0"/>
-              <a:t>11/5/19</a:t>
+              <a:t>11/9/19</a:t>
             </a:fld>
             <a:endParaRPr lang="en-US" dirty="0"/>
           </a:p>
@@ -21410,7 +21410,7 @@
           <a:p>
             <a:fld id="{F41C90BC-BB19-D143-A85E-83FF99B72C97}" type="datetime1">
               <a:rPr lang="en-US" smtClean="0"/>
-              <a:t>11/5/19</a:t>
+              <a:t>11/9/19</a:t>
             </a:fld>
             <a:endParaRPr lang="en-US" dirty="0"/>
           </a:p>
@@ -21641,7 +21641,7 @@
           <a:p>
             <a:fld id="{F41C90BC-BB19-D143-A85E-83FF99B72C97}" type="datetime1">
               <a:rPr lang="en-US" smtClean="0"/>
-              <a:t>11/5/19</a:t>
+              <a:t>11/9/19</a:t>
             </a:fld>
             <a:endParaRPr lang="en-US" dirty="0"/>
           </a:p>
@@ -21824,7 +21824,7 @@
           <a:p>
             <a:fld id="{F41C90BC-BB19-D143-A85E-83FF99B72C97}" type="datetime1">
               <a:rPr lang="en-US" smtClean="0"/>
-              <a:t>11/5/19</a:t>
+              <a:t>11/9/19</a:t>
             </a:fld>
             <a:endParaRPr lang="en-US" dirty="0"/>
           </a:p>
@@ -22097,7 +22097,7 @@
           <a:p>
             <a:fld id="{F41C90BC-BB19-D143-A85E-83FF99B72C97}" type="datetime1">
               <a:rPr lang="en-US" smtClean="0"/>
-              <a:t>11/5/19</a:t>
+              <a:t>11/9/19</a:t>
             </a:fld>
             <a:endParaRPr lang="en-US" dirty="0"/>
           </a:p>
@@ -22315,7 +22315,7 @@
           <a:p>
             <a:fld id="{F41C90BC-BB19-D143-A85E-83FF99B72C97}" type="datetime1">
               <a:rPr lang="en-US" smtClean="0"/>
-              <a:t>11/5/19</a:t>
+              <a:t>11/9/19</a:t>
             </a:fld>
             <a:endParaRPr lang="en-US" dirty="0"/>
           </a:p>
@@ -22549,7 +22549,7 @@
           <a:p>
             <a:fld id="{F41C90BC-BB19-D143-A85E-83FF99B72C97}" type="datetime1">
               <a:rPr lang="en-US" smtClean="0"/>
-              <a:t>11/5/19</a:t>
+              <a:t>11/9/19</a:t>
             </a:fld>
             <a:endParaRPr lang="en-US" dirty="0"/>
           </a:p>
@@ -22758,7 +22758,7 @@
           <a:p>
             <a:fld id="{F41C90BC-BB19-D143-A85E-83FF99B72C97}" type="datetime1">
               <a:rPr lang="en-US" smtClean="0"/>
-              <a:t>11/5/19</a:t>
+              <a:t>11/9/19</a:t>
             </a:fld>
             <a:endParaRPr lang="en-US" dirty="0"/>
           </a:p>
@@ -23221,7 +23221,7 @@
           <a:p>
             <a:fld id="{F41C90BC-BB19-D143-A85E-83FF99B72C97}" type="datetime1">
               <a:rPr lang="en-US" smtClean="0"/>
-              <a:t>11/5/19</a:t>
+              <a:t>11/9/19</a:t>
             </a:fld>
             <a:endParaRPr lang="en-US" dirty="0"/>
           </a:p>
@@ -23434,7 +23434,7 @@
           <a:p>
             <a:fld id="{F41C90BC-BB19-D143-A85E-83FF99B72C97}" type="datetime1">
               <a:rPr lang="en-US" smtClean="0"/>
-              <a:t>11/5/19</a:t>
+              <a:t>11/9/19</a:t>
             </a:fld>
             <a:endParaRPr lang="en-US" dirty="0"/>
           </a:p>
@@ -23704,7 +23704,7 @@
           <a:p>
             <a:fld id="{F41C90BC-BB19-D143-A85E-83FF99B72C97}" type="datetime1">
               <a:rPr lang="en-US" smtClean="0"/>
-              <a:t>11/5/19</a:t>
+              <a:t>11/9/19</a:t>
             </a:fld>
             <a:endParaRPr lang="en-US" dirty="0"/>
           </a:p>
@@ -23978,7 +23978,7 @@
           <a:p>
             <a:fld id="{F41C90BC-BB19-D143-A85E-83FF99B72C97}" type="datetime1">
               <a:rPr lang="en-US" smtClean="0"/>
-              <a:t>11/5/19</a:t>
+              <a:t>11/9/19</a:t>
             </a:fld>
             <a:endParaRPr lang="en-US" dirty="0"/>
           </a:p>
@@ -24214,7 +24214,7 @@
           <a:p>
             <a:fld id="{0B848705-F641-8242-9A1B-827F55C137C9}" type="datetime1">
               <a:rPr lang="en-US" smtClean="0"/>
-              <a:t>11/5/19</a:t>
+              <a:t>11/9/19</a:t>
             </a:fld>
             <a:endParaRPr lang="en-US" dirty="0"/>
           </a:p>
@@ -24390,7 +24390,7 @@
           <a:p>
             <a:fld id="{F41C90BC-BB19-D143-A85E-83FF99B72C97}" type="datetime1">
               <a:rPr lang="en-US" smtClean="0"/>
-              <a:t>11/5/19</a:t>
+              <a:t>11/9/19</a:t>
             </a:fld>
             <a:endParaRPr lang="en-US" dirty="0"/>
           </a:p>
@@ -24768,7 +24768,7 @@
           <a:p>
             <a:fld id="{24CB914A-C220-3042-A9BD-FF4585093C40}" type="datetime1">
               <a:rPr lang="en-US" smtClean="0"/>
-              <a:t>11/5/19</a:t>
+              <a:t>11/9/19</a:t>
             </a:fld>
             <a:endParaRPr lang="en-US" dirty="0"/>
           </a:p>
@@ -24978,7 +24978,7 @@
           <a:p>
             <a:fld id="{F41C90BC-BB19-D143-A85E-83FF99B72C97}" type="datetime1">
               <a:rPr lang="en-US" smtClean="0"/>
-              <a:t>11/5/19</a:t>
+              <a:t>11/9/19</a:t>
             </a:fld>
             <a:endParaRPr lang="en-US" dirty="0"/>
           </a:p>
@@ -25243,7 +25243,7 @@
           <a:p>
             <a:fld id="{27EB6CFC-CC10-7D47-805A-2FDF0FD11B79}" type="datetime1">
               <a:rPr lang="en-US" smtClean="0"/>
-              <a:t>11/5/19</a:t>
+              <a:t>11/9/19</a:t>
             </a:fld>
             <a:endParaRPr lang="en-US" dirty="0"/>
           </a:p>
@@ -25456,7 +25456,7 @@
           <a:p>
             <a:fld id="{47C4211C-1F3A-AC45-9C80-E3D84429544F}" type="datetime1">
               <a:rPr lang="en-US" smtClean="0"/>
-              <a:t>11/5/19</a:t>
+              <a:t>11/9/19</a:t>
             </a:fld>
             <a:endParaRPr lang="en-US" dirty="0"/>
           </a:p>
@@ -25744,7 +25744,7 @@
           <a:p>
             <a:fld id="{1D69B50D-8CA7-3545-ABF8-6A1D0A326DA9}" type="datetime1">
               <a:rPr lang="en-US" smtClean="0"/>
-              <a:t>11/5/19</a:t>
+              <a:t>11/9/19</a:t>
             </a:fld>
             <a:endParaRPr lang="en-US" dirty="0"/>
           </a:p>
@@ -25949,7 +25949,7 @@
           <a:p>
             <a:fld id="{6ED24961-F159-804B-BDDB-F47CC42DA57F}" type="datetime1">
               <a:rPr lang="en-US" smtClean="0"/>
-              <a:t>11/5/19</a:t>
+              <a:t>11/9/19</a:t>
             </a:fld>
             <a:endParaRPr lang="en-US" dirty="0"/>
           </a:p>
@@ -26119,7 +26119,7 @@
           <a:p>
             <a:fld id="{2AD84113-9B5A-A74C-87C9-971C081AC3CF}" type="datetime1">
               <a:rPr lang="en-US" smtClean="0"/>
-              <a:t>11/5/19</a:t>
+              <a:t>11/9/19</a:t>
             </a:fld>
             <a:endParaRPr lang="en-US" dirty="0"/>
           </a:p>
@@ -26325,7 +26325,7 @@
           <a:p>
             <a:fld id="{23A1E575-9BA8-4A4C-9CB9-42B334EA45AF}" type="datetime1">
               <a:rPr lang="en-US" smtClean="0"/>
-              <a:t>11/5/19</a:t>
+              <a:t>11/9/19</a:t>
             </a:fld>
             <a:endParaRPr lang="en-US" dirty="0"/>
           </a:p>
@@ -26508,7 +26508,7 @@
           <a:p>
             <a:fld id="{D8CFB387-4E35-DD48-898A-F982CA0031A4}" type="datetime1">
               <a:rPr lang="en-US" smtClean="0"/>
-              <a:t>11/6/19</a:t>
+              <a:t>11/9/19</a:t>
             </a:fld>
             <a:endParaRPr lang="en-US" dirty="0"/>
           </a:p>
@@ -26689,7 +26689,7 @@
           <a:p>
             <a:fld id="{F41C90BC-BB19-D143-A85E-83FF99B72C97}" type="datetime1">
               <a:rPr lang="en-US" smtClean="0"/>
-              <a:t>11/6/19</a:t>
+              <a:t>11/9/19</a:t>
             </a:fld>
             <a:endParaRPr lang="en-US" dirty="0"/>
           </a:p>
@@ -26895,7 +26895,7 @@
           <a:p>
             <a:fld id="{F41C90BC-BB19-D143-A85E-83FF99B72C97}" type="datetime1">
               <a:rPr lang="en-US" smtClean="0"/>
-              <a:t>11/6/19</a:t>
+              <a:t>11/9/19</a:t>
             </a:fld>
             <a:endParaRPr lang="en-US" dirty="0"/>
           </a:p>
@@ -27101,7 +27101,7 @@
           <a:p>
             <a:fld id="{F41C90BC-BB19-D143-A85E-83FF99B72C97}" type="datetime1">
               <a:rPr lang="en-US" smtClean="0"/>
-              <a:t>11/6/19</a:t>
+              <a:t>11/9/19</a:t>
             </a:fld>
             <a:endParaRPr lang="en-US" dirty="0"/>
           </a:p>
@@ -27314,7 +27314,7 @@
           <a:p>
             <a:fld id="{D8CFB387-4E35-DD48-898A-F982CA0031A4}" type="datetime1">
               <a:rPr lang="en-US" smtClean="0"/>
-              <a:t>11/6/19</a:t>
+              <a:t>11/9/19</a:t>
             </a:fld>
             <a:endParaRPr lang="en-US" dirty="0"/>
           </a:p>
@@ -27454,8 +27454,8 @@
         </p:nvSpPr>
         <p:spPr/>
         <p:txBody>
-          <a:bodyPr>
-            <a:normAutofit lnSpcReduction="10000"/>
+          <a:bodyPr numCol="2">
+            <a:normAutofit fontScale="92500" lnSpcReduction="10000"/>
           </a:bodyPr>
           <a:lstStyle/>
           <a:p>
@@ -27475,11 +27475,17 @@
               <a:rPr lang="en-US" dirty="0">
                 <a:hlinkClick r:id="rId3"/>
               </a:rPr>
-              <a:t>A Byte of Python</a:t>
-            </a:r>
-            <a:r>
-              <a:rPr lang="en-US" dirty="0"/>
-              <a:t>, Swaroop C H.</a:t>
+              <a:t>Learn To Code With Python</a:t>
+            </a:r>
+            <a:r>
+              <a:rPr lang="en-US" dirty="0"/>
+              <a:t>, the website for this course.</a:t>
+            </a:r>
+          </a:p>
+          <a:p>
+            <a:r>
+              <a:rPr lang="en-US" dirty="0"/>
+              <a:t>Useful Books</a:t>
             </a:r>
           </a:p>
           <a:p>
@@ -27487,19 +27493,20 @@
               <a:rPr lang="en-US" dirty="0">
                 <a:hlinkClick r:id="rId4"/>
               </a:rPr>
-              <a:t>Allen B. Downey’s "Think Python 2nd Edition by Allen B. Downey" book</a:t>
-            </a:r>
-            <a:r>
-              <a:rPr lang="en-US" dirty="0"/>
-              <a:t>.</a:t>
-            </a:r>
-          </a:p>
-          <a:p>
+              <a:t>A Byte of Python</a:t>
+            </a:r>
+            <a:r>
+              <a:rPr lang="en-US" dirty="0"/>
+              <a:t>, Swaroop C H.</a:t>
+            </a:r>
+          </a:p>
+          <a:p>
+            <a:pPr lvl="1"/>
             <a:r>
               <a:rPr lang="en-US" dirty="0">
                 <a:hlinkClick r:id="rId5"/>
               </a:rPr>
-              <a:t>The Quick Python Book 3rd Edition by Naomi Ceder</a:t>
+              <a:t>Allen B. Downey’s "Think Python 2nd Edition by Allen B. Downey" book</a:t>
             </a:r>
             <a:r>
               <a:rPr lang="en-US" dirty="0"/>
@@ -27507,35 +27514,37 @@
             </a:r>
           </a:p>
           <a:p>
+            <a:pPr lvl="1"/>
             <a:r>
               <a:rPr lang="en-US" dirty="0">
                 <a:hlinkClick r:id="rId6"/>
               </a:rPr>
-              <a:t>Invent Your Own Computer Games with Python 3rd Edition</a:t>
-            </a:r>
-            <a:r>
-              <a:rPr lang="en-US" dirty="0"/>
-              <a:t>, Al </a:t>
-            </a:r>
-            <a:r>
-              <a:rPr lang="en-US" dirty="0" err="1"/>
-              <a:t>Sweigart</a:t>
-            </a:r>
-            <a:r>
-              <a:rPr lang="en-US" dirty="0"/>
-              <a:t>, March, 2015. </a:t>
-            </a:r>
-          </a:p>
-          <a:p>
+              <a:t>The Quick Python Book 3rd Edition by Naomi Ceder</a:t>
+            </a:r>
+            <a:r>
+              <a:rPr lang="en-US" dirty="0"/>
+              <a:t>.</a:t>
+            </a:r>
+          </a:p>
+          <a:p>
+            <a:pPr lvl="1"/>
             <a:r>
               <a:rPr lang="en-US" dirty="0">
                 <a:hlinkClick r:id="rId7"/>
               </a:rPr>
-              <a:t>Learn To Code With Python</a:t>
-            </a:r>
-            <a:r>
-              <a:rPr lang="en-US" dirty="0"/>
-              <a:t>, the website for this course.</a:t>
+              <a:t>Invent Your Own Computer Games with Python 3rd Edition</a:t>
+            </a:r>
+            <a:r>
+              <a:rPr lang="en-US" dirty="0"/>
+              <a:t>, Al </a:t>
+            </a:r>
+            <a:r>
+              <a:rPr lang="en-US" dirty="0" err="1"/>
+              <a:t>Sweigart</a:t>
+            </a:r>
+            <a:r>
+              <a:rPr lang="en-US" dirty="0"/>
+              <a:t>, March, 2015. </a:t>
             </a:r>
           </a:p>
           <a:p>
@@ -27577,6 +27586,52 @@
               <a:t>(quick learning).</a:t>
             </a:r>
           </a:p>
+          <a:p>
+            <a:r>
+              <a:rPr lang="en-US" dirty="0"/>
+              <a:t>Basic commands</a:t>
+            </a:r>
+          </a:p>
+          <a:p>
+            <a:pPr lvl="1"/>
+            <a:r>
+              <a:rPr lang="en-US" dirty="0"/>
+              <a:t>Windows: </a:t>
+            </a:r>
+            <a:r>
+              <a:rPr lang="en-US" dirty="0">
+                <a:hlinkClick r:id="rId10"/>
+              </a:rPr>
+              <a:t>11 basic commands you should know (cd, dir, mkdir, etc.)</a:t>
+            </a:r>
+            <a:endParaRPr lang="en-US" dirty="0"/>
+          </a:p>
+          <a:p>
+            <a:pPr lvl="1"/>
+            <a:r>
+              <a:rPr lang="en-US" dirty="0">
+                <a:hlinkClick r:id="rId11"/>
+              </a:rPr>
+              <a:t>How to use the Terminal command line in Mac OS</a:t>
+            </a:r>
+            <a:r>
+              <a:rPr lang="en-US" dirty="0"/>
+              <a:t>.</a:t>
+            </a:r>
+          </a:p>
+          <a:p>
+            <a:pPr lvl="1"/>
+            <a:r>
+              <a:rPr lang="en-US" dirty="0">
+                <a:hlinkClick r:id="rId12"/>
+              </a:rPr>
+              <a:t>Basic Linux/Unix Commands with Examples</a:t>
+            </a:r>
+            <a:r>
+              <a:rPr lang="en-US" dirty="0"/>
+              <a:t>.</a:t>
+            </a:r>
+          </a:p>
         </p:txBody>
       </p:sp>
       <p:sp>
@@ -27602,7 +27657,7 @@
           <a:p>
             <a:fld id="{62812272-7129-6A41-89EB-231BED5365BC}" type="datetime1">
               <a:rPr lang="en-US" smtClean="0"/>
-              <a:t>11/5/19</a:t>
+              <a:t>11/9/19</a:t>
             </a:fld>
             <a:endParaRPr lang="en-US" dirty="0"/>
           </a:p>
@@ -27778,7 +27833,7 @@
           <a:p>
             <a:fld id="{F41C90BC-BB19-D143-A85E-83FF99B72C97}" type="datetime1">
               <a:rPr lang="en-US" smtClean="0"/>
-              <a:t>11/6/19</a:t>
+              <a:t>11/9/19</a:t>
             </a:fld>
             <a:endParaRPr lang="en-US" dirty="0"/>
           </a:p>
@@ -27984,7 +28039,7 @@
           <a:p>
             <a:fld id="{F41C90BC-BB19-D143-A85E-83FF99B72C97}" type="datetime1">
               <a:rPr lang="en-US" smtClean="0"/>
-              <a:t>11/6/19</a:t>
+              <a:t>11/9/19</a:t>
             </a:fld>
             <a:endParaRPr lang="en-US" dirty="0"/>
           </a:p>
@@ -28190,7 +28245,7 @@
           <a:p>
             <a:fld id="{F41C90BC-BB19-D143-A85E-83FF99B72C97}" type="datetime1">
               <a:rPr lang="en-US" smtClean="0"/>
-              <a:t>11/6/19</a:t>
+              <a:t>11/9/19</a:t>
             </a:fld>
             <a:endParaRPr lang="en-US" dirty="0"/>
           </a:p>
@@ -28404,7 +28459,7 @@
           <a:p>
             <a:fld id="{F41C90BC-BB19-D143-A85E-83FF99B72C97}" type="datetime1">
               <a:rPr lang="en-US" smtClean="0"/>
-              <a:t>11/6/19</a:t>
+              <a:t>11/9/19</a:t>
             </a:fld>
             <a:endParaRPr lang="en-US" dirty="0"/>
           </a:p>
@@ -28610,7 +28665,7 @@
           <a:p>
             <a:fld id="{F41C90BC-BB19-D143-A85E-83FF99B72C97}" type="datetime1">
               <a:rPr lang="en-US" smtClean="0"/>
-              <a:t>11/6/19</a:t>
+              <a:t>11/9/19</a:t>
             </a:fld>
             <a:endParaRPr lang="en-US" dirty="0"/>
           </a:p>
@@ -28878,7 +28933,7 @@
           <a:p>
             <a:fld id="{9E6E5178-8466-C541-9C8C-870FF1D7F4A0}" type="datetime1">
               <a:rPr lang="en-US" smtClean="0"/>
-              <a:t>11/5/19</a:t>
+              <a:t>11/9/19</a:t>
             </a:fld>
             <a:endParaRPr lang="en-US" dirty="0"/>
           </a:p>
@@ -29159,7 +29214,7 @@
           <a:p>
             <a:fld id="{E38036DF-5438-E24D-8A34-3AE6463584F2}" type="datetime1">
               <a:rPr lang="en-US" smtClean="0"/>
-              <a:t>11/5/19</a:t>
+              <a:t>11/9/19</a:t>
             </a:fld>
             <a:endParaRPr lang="en-US" dirty="0"/>
           </a:p>
@@ -29380,7 +29435,7 @@
           <a:p>
             <a:fld id="{20CF5326-0190-C34E-A2C2-8B3E7E234A10}" type="datetime1">
               <a:rPr lang="en-US" smtClean="0"/>
-              <a:t>11/5/19</a:t>
+              <a:t>11/9/19</a:t>
             </a:fld>
             <a:endParaRPr lang="en-US" dirty="0"/>
           </a:p>
@@ -29581,7 +29636,7 @@
           <a:p>
             <a:fld id="{DCEDA79C-83DB-7344-BAF6-3B993E2CB087}" type="datetime1">
               <a:rPr lang="en-US" smtClean="0"/>
-              <a:t>11/5/19</a:t>
+              <a:t>11/9/19</a:t>
             </a:fld>
             <a:endParaRPr lang="en-US" dirty="0"/>
           </a:p>
@@ -29807,7 +29862,7 @@
           <a:p>
             <a:fld id="{EDDA4730-FC36-F741-9C92-3F77967892D9}" type="datetime1">
               <a:rPr lang="en-US" smtClean="0"/>
-              <a:t>11/5/19</a:t>
+              <a:t>11/9/19</a:t>
             </a:fld>
             <a:endParaRPr lang="en-US" dirty="0"/>
           </a:p>
@@ -30001,7 +30056,7 @@
           <a:p>
             <a:fld id="{8ADF77C5-A6E1-9947-83BF-FA137C5DB2E0}" type="datetime1">
               <a:rPr lang="en-US" smtClean="0"/>
-              <a:t>11/5/19</a:t>
+              <a:t>11/9/19</a:t>
             </a:fld>
             <a:endParaRPr lang="en-US" dirty="0"/>
           </a:p>
@@ -30182,7 +30237,7 @@
           <a:p>
             <a:fld id="{110B6A71-1DC0-9E41-9724-D7A68B3BE044}" type="datetime1">
               <a:rPr lang="en-US" smtClean="0"/>
-              <a:t>11/5/19</a:t>
+              <a:t>11/9/19</a:t>
             </a:fld>
             <a:endParaRPr lang="en-US" dirty="0"/>
           </a:p>
@@ -30403,7 +30458,7 @@
           <a:p>
             <a:fld id="{F41C90BC-BB19-D143-A85E-83FF99B72C97}" type="datetime1">
               <a:rPr lang="en-US" smtClean="0"/>
-              <a:t>11/5/19</a:t>
+              <a:t>11/9/19</a:t>
             </a:fld>
             <a:endParaRPr lang="en-US" dirty="0"/>
           </a:p>
@@ -30573,7 +30628,7 @@
           <a:p>
             <a:fld id="{110B6A71-1DC0-9E41-9724-D7A68B3BE044}" type="datetime1">
               <a:rPr lang="en-US" smtClean="0"/>
-              <a:t>11/5/19</a:t>
+              <a:t>11/9/19</a:t>
             </a:fld>
             <a:endParaRPr lang="en-US" dirty="0"/>
           </a:p>
@@ -30839,7 +30894,7 @@
           <a:p>
             <a:fld id="{F7235BF8-14BA-0E4F-B7ED-09ACC059EE16}" type="datetime1">
               <a:rPr lang="en-US" smtClean="0"/>
-              <a:t>11/5/19</a:t>
+              <a:t>11/9/19</a:t>
             </a:fld>
             <a:endParaRPr lang="en-US" dirty="0"/>
           </a:p>
@@ -31083,7 +31138,7 @@
           <a:p>
             <a:fld id="{F41C90BC-BB19-D143-A85E-83FF99B72C97}" type="datetime1">
               <a:rPr lang="en-US" smtClean="0"/>
-              <a:t>11/5/19</a:t>
+              <a:t>11/9/19</a:t>
             </a:fld>
             <a:endParaRPr lang="en-US" dirty="0"/>
           </a:p>
@@ -31371,7 +31426,7 @@
           <a:p>
             <a:fld id="{F41C90BC-BB19-D143-A85E-83FF99B72C97}" type="datetime1">
               <a:rPr lang="en-US" smtClean="0"/>
-              <a:t>11/5/19</a:t>
+              <a:t>11/9/19</a:t>
             </a:fld>
             <a:endParaRPr lang="en-US" dirty="0"/>
           </a:p>
@@ -31634,7 +31689,7 @@
           <a:p>
             <a:fld id="{F41C90BC-BB19-D143-A85E-83FF99B72C97}" type="datetime1">
               <a:rPr lang="en-US" smtClean="0"/>
-              <a:t>11/5/19</a:t>
+              <a:t>11/9/19</a:t>
             </a:fld>
             <a:endParaRPr lang="en-US" dirty="0"/>
           </a:p>
@@ -31871,7 +31926,7 @@
           <a:p>
             <a:fld id="{F41C90BC-BB19-D143-A85E-83FF99B72C97}" type="datetime1">
               <a:rPr lang="en-US" smtClean="0"/>
-              <a:t>11/5/19</a:t>
+              <a:t>11/9/19</a:t>
             </a:fld>
             <a:endParaRPr lang="en-US" dirty="0"/>
           </a:p>
@@ -32144,7 +32199,7 @@
           <a:p>
             <a:fld id="{F41C90BC-BB19-D143-A85E-83FF99B72C97}" type="datetime1">
               <a:rPr lang="en-US" smtClean="0"/>
-              <a:t>11/5/19</a:t>
+              <a:t>11/9/19</a:t>
             </a:fld>
             <a:endParaRPr lang="en-US" dirty="0"/>
           </a:p>
@@ -32378,7 +32433,7 @@
           <a:p>
             <a:fld id="{F41C90BC-BB19-D143-A85E-83FF99B72C97}" type="datetime1">
               <a:rPr lang="en-US" smtClean="0"/>
-              <a:t>11/5/19</a:t>
+              <a:t>11/9/19</a:t>
             </a:fld>
             <a:endParaRPr lang="en-US" dirty="0"/>
           </a:p>
@@ -32590,7 +32645,7 @@
           <a:p>
             <a:fld id="{30AE3F85-E100-394E-A5B5-4233C5C8B294}" type="datetime1">
               <a:rPr lang="en-US" smtClean="0"/>
-              <a:t>11/5/19</a:t>
+              <a:t>11/9/19</a:t>
             </a:fld>
             <a:endParaRPr lang="en-US" dirty="0"/>
           </a:p>
@@ -32845,7 +32900,7 @@
           <a:p>
             <a:fld id="{F41C90BC-BB19-D143-A85E-83FF99B72C97}" type="datetime1">
               <a:rPr lang="en-US" smtClean="0"/>
-              <a:t>11/5/19</a:t>
+              <a:t>11/9/19</a:t>
             </a:fld>
             <a:endParaRPr lang="en-US" dirty="0"/>
           </a:p>
@@ -33053,7 +33108,7 @@
           <a:p>
             <a:fld id="{F41C90BC-BB19-D143-A85E-83FF99B72C97}" type="datetime1">
               <a:rPr lang="en-US" smtClean="0"/>
-              <a:t>11/5/19</a:t>
+              <a:t>11/9/19</a:t>
             </a:fld>
             <a:endParaRPr lang="en-US" dirty="0"/>
           </a:p>
@@ -33269,7 +33324,7 @@
           <a:p>
             <a:fld id="{F41C90BC-BB19-D143-A85E-83FF99B72C97}" type="datetime1">
               <a:rPr lang="en-US" smtClean="0"/>
-              <a:t>11/5/19</a:t>
+              <a:t>11/9/19</a:t>
             </a:fld>
             <a:endParaRPr lang="en-US" dirty="0"/>
           </a:p>
@@ -33483,7 +33538,7 @@
           <a:p>
             <a:fld id="{F41C90BC-BB19-D143-A85E-83FF99B72C97}" type="datetime1">
               <a:rPr lang="en-US" smtClean="0"/>
-              <a:t>11/5/19</a:t>
+              <a:t>11/9/19</a:t>
             </a:fld>
             <a:endParaRPr lang="en-US" dirty="0"/>
           </a:p>
@@ -34013,7 +34068,7 @@
           <a:p>
             <a:fld id="{F41C90BC-BB19-D143-A85E-83FF99B72C97}" type="datetime1">
               <a:rPr lang="en-US" smtClean="0"/>
-              <a:t>11/5/19</a:t>
+              <a:t>11/9/19</a:t>
             </a:fld>
             <a:endParaRPr lang="en-US" dirty="0"/>
           </a:p>
@@ -34341,7 +34396,7 @@
           <a:p>
             <a:fld id="{F41C90BC-BB19-D143-A85E-83FF99B72C97}" type="datetime1">
               <a:rPr lang="en-US" smtClean="0"/>
-              <a:t>11/5/19</a:t>
+              <a:t>11/9/19</a:t>
             </a:fld>
             <a:endParaRPr lang="en-US" dirty="0"/>
           </a:p>
@@ -34511,7 +34566,7 @@
           <a:p>
             <a:fld id="{D8CFB387-4E35-DD48-898A-F982CA0031A4}" type="datetime1">
               <a:rPr lang="en-US" smtClean="0"/>
-              <a:t>11/5/19</a:t>
+              <a:t>11/9/19</a:t>
             </a:fld>
             <a:endParaRPr lang="en-US" dirty="0"/>
           </a:p>
@@ -34762,7 +34817,7 @@
           <a:p>
             <a:fld id="{F41C90BC-BB19-D143-A85E-83FF99B72C97}" type="datetime1">
               <a:rPr lang="en-US" smtClean="0"/>
-              <a:t>11/5/19</a:t>
+              <a:t>11/9/19</a:t>
             </a:fld>
             <a:endParaRPr lang="en-US" dirty="0"/>
           </a:p>
@@ -35434,7 +35489,7 @@
           <a:p>
             <a:fld id="{F41C90BC-BB19-D143-A85E-83FF99B72C97}" type="datetime1">
               <a:rPr lang="en-US" smtClean="0"/>
-              <a:t>11/5/19</a:t>
+              <a:t>11/9/19</a:t>
             </a:fld>
             <a:endParaRPr lang="en-US" dirty="0"/>
           </a:p>
@@ -35628,7 +35683,7 @@
           <a:p>
             <a:fld id="{F41C90BC-BB19-D143-A85E-83FF99B72C97}" type="datetime1">
               <a:rPr lang="en-US" smtClean="0"/>
-              <a:t>11/5/19</a:t>
+              <a:t>11/9/19</a:t>
             </a:fld>
             <a:endParaRPr lang="en-US" dirty="0"/>
           </a:p>
@@ -35807,7 +35862,7 @@
           <a:p>
             <a:fld id="{8BE6E48B-8D19-0F4E-8128-5F73DDD38CCC}" type="datetime1">
               <a:rPr lang="en-US" smtClean="0"/>
-              <a:t>11/5/19</a:t>
+              <a:t>11/9/19</a:t>
             </a:fld>
             <a:endParaRPr lang="en-US" dirty="0"/>
           </a:p>
@@ -35977,7 +36032,7 @@
           <a:p>
             <a:fld id="{D8CFB387-4E35-DD48-898A-F982CA0031A4}" type="datetime1">
               <a:rPr lang="en-US" smtClean="0"/>
-              <a:t>11/5/19</a:t>
+              <a:t>11/9/19</a:t>
             </a:fld>
             <a:endParaRPr lang="en-US" dirty="0"/>
           </a:p>
@@ -36217,7 +36272,7 @@
           <a:p>
             <a:fld id="{F41C90BC-BB19-D143-A85E-83FF99B72C97}" type="datetime1">
               <a:rPr lang="en-US" smtClean="0"/>
-              <a:t>11/5/19</a:t>
+              <a:t>11/9/19</a:t>
             </a:fld>
             <a:endParaRPr lang="en-US" dirty="0"/>
           </a:p>
@@ -36959,7 +37014,7 @@
           <a:p>
             <a:fld id="{F41C90BC-BB19-D143-A85E-83FF99B72C97}" type="datetime1">
               <a:rPr lang="en-US" smtClean="0"/>
-              <a:t>11/5/19</a:t>
+              <a:t>11/9/19</a:t>
             </a:fld>
             <a:endParaRPr lang="en-US" dirty="0"/>
           </a:p>
@@ -37166,7 +37221,7 @@
           <a:p>
             <a:fld id="{F41C90BC-BB19-D143-A85E-83FF99B72C97}" type="datetime1">
               <a:rPr lang="en-US" smtClean="0"/>
-              <a:t>11/5/19</a:t>
+              <a:t>11/9/19</a:t>
             </a:fld>
             <a:endParaRPr lang="en-US" dirty="0"/>
           </a:p>
@@ -39758,7 +39813,7 @@
           <a:p>
             <a:fld id="{F41C90BC-BB19-D143-A85E-83FF99B72C97}" type="datetime1">
               <a:rPr lang="en-US" smtClean="0"/>
-              <a:t>11/5/19</a:t>
+              <a:t>11/9/19</a:t>
             </a:fld>
             <a:endParaRPr lang="en-US" dirty="0"/>
           </a:p>
@@ -40074,7 +40129,7 @@
           <a:p>
             <a:fld id="{F41C90BC-BB19-D143-A85E-83FF99B72C97}" type="datetime1">
               <a:rPr lang="en-US" smtClean="0"/>
-              <a:t>11/5/19</a:t>
+              <a:t>11/9/19</a:t>
             </a:fld>
             <a:endParaRPr lang="en-US" dirty="0"/>
           </a:p>
@@ -40280,7 +40335,7 @@
           <a:p>
             <a:fld id="{F41C90BC-BB19-D143-A85E-83FF99B72C97}" type="datetime1">
               <a:rPr lang="en-US" smtClean="0"/>
-              <a:t>11/5/19</a:t>
+              <a:t>11/9/19</a:t>
             </a:fld>
             <a:endParaRPr lang="en-US" dirty="0"/>
           </a:p>
@@ -40489,7 +40544,7 @@
           <a:p>
             <a:fld id="{F41C90BC-BB19-D143-A85E-83FF99B72C97}" type="datetime1">
               <a:rPr lang="en-US" smtClean="0"/>
-              <a:t>11/5/19</a:t>
+              <a:t>11/9/19</a:t>
             </a:fld>
             <a:endParaRPr lang="en-US" dirty="0"/>
           </a:p>
@@ -40677,7 +40732,7 @@
           <a:p>
             <a:fld id="{F41C90BC-BB19-D143-A85E-83FF99B72C97}" type="datetime1">
               <a:rPr lang="en-US" smtClean="0"/>
-              <a:t>11/5/19</a:t>
+              <a:t>11/9/19</a:t>
             </a:fld>
             <a:endParaRPr lang="en-US" dirty="0"/>
           </a:p>
@@ -40847,7 +40902,7 @@
           <a:p>
             <a:fld id="{D8CFB387-4E35-DD48-898A-F982CA0031A4}" type="datetime1">
               <a:rPr lang="en-US" smtClean="0"/>
-              <a:t>11/5/19</a:t>
+              <a:t>11/9/19</a:t>
             </a:fld>
             <a:endParaRPr lang="en-US" dirty="0"/>
           </a:p>
@@ -41033,7 +41088,7 @@
           <a:p>
             <a:fld id="{74AC3D48-A34A-134F-87E1-6A509A09815E}" type="datetime1">
               <a:rPr lang="en-US" smtClean="0"/>
-              <a:t>11/5/19</a:t>
+              <a:t>11/9/19</a:t>
             </a:fld>
             <a:endParaRPr lang="en-US" dirty="0"/>
           </a:p>
@@ -41334,7 +41389,7 @@
           <a:p>
             <a:fld id="{F41C90BC-BB19-D143-A85E-83FF99B72C97}" type="datetime1">
               <a:rPr lang="en-US" smtClean="0"/>
-              <a:t>11/5/19</a:t>
+              <a:t>11/9/19</a:t>
             </a:fld>
             <a:endParaRPr lang="en-US" dirty="0"/>
           </a:p>
@@ -41543,7 +41598,7 @@
           <a:p>
             <a:fld id="{F41C90BC-BB19-D143-A85E-83FF99B72C97}" type="datetime1">
               <a:rPr lang="en-US" smtClean="0"/>
-              <a:t>11/5/19</a:t>
+              <a:t>11/9/19</a:t>
             </a:fld>
             <a:endParaRPr lang="en-US" dirty="0"/>
           </a:p>
@@ -41782,7 +41837,7 @@
           <a:p>
             <a:fld id="{F41C90BC-BB19-D143-A85E-83FF99B72C97}" type="datetime1">
               <a:rPr lang="en-US" smtClean="0"/>
-              <a:t>11/5/19</a:t>
+              <a:t>11/9/19</a:t>
             </a:fld>
             <a:endParaRPr lang="en-US" dirty="0"/>
           </a:p>
@@ -42032,7 +42087,7 @@
           <a:p>
             <a:fld id="{F41C90BC-BB19-D143-A85E-83FF99B72C97}" type="datetime1">
               <a:rPr lang="en-US" smtClean="0"/>
-              <a:t>11/5/19</a:t>
+              <a:t>11/9/19</a:t>
             </a:fld>
             <a:endParaRPr lang="en-US" dirty="0"/>
           </a:p>
@@ -42202,7 +42257,7 @@
           <a:p>
             <a:fld id="{D8CFB387-4E35-DD48-898A-F982CA0031A4}" type="datetime1">
               <a:rPr lang="en-US" smtClean="0"/>
-              <a:t>11/5/19</a:t>
+              <a:t>11/9/19</a:t>
             </a:fld>
             <a:endParaRPr lang="en-US" dirty="0"/>
           </a:p>
@@ -42700,7 +42755,7 @@
           <a:p>
             <a:fld id="{F41C90BC-BB19-D143-A85E-83FF99B72C97}" type="datetime1">
               <a:rPr lang="en-US" smtClean="0"/>
-              <a:t>11/5/19</a:t>
+              <a:t>11/9/19</a:t>
             </a:fld>
             <a:endParaRPr lang="en-US" dirty="0"/>
           </a:p>
@@ -42999,7 +43054,7 @@
           <a:p>
             <a:fld id="{F41C90BC-BB19-D143-A85E-83FF99B72C97}" type="datetime1">
               <a:rPr lang="en-US" smtClean="0"/>
-              <a:t>11/5/19</a:t>
+              <a:t>11/9/19</a:t>
             </a:fld>
             <a:endParaRPr lang="en-US" dirty="0"/>
           </a:p>
@@ -43221,7 +43276,7 @@
           <a:p>
             <a:fld id="{F41C90BC-BB19-D143-A85E-83FF99B72C97}" type="datetime1">
               <a:rPr lang="en-US" smtClean="0"/>
-              <a:t>11/5/19</a:t>
+              <a:t>11/9/19</a:t>
             </a:fld>
             <a:endParaRPr lang="en-US" dirty="0"/>
           </a:p>
@@ -43415,7 +43470,7 @@
           <a:p>
             <a:fld id="{F41C90BC-BB19-D143-A85E-83FF99B72C97}" type="datetime1">
               <a:rPr lang="en-US" smtClean="0"/>
-              <a:t>11/5/19</a:t>
+              <a:t>11/9/19</a:t>
             </a:fld>
             <a:endParaRPr lang="en-US" dirty="0"/>
           </a:p>
@@ -43662,7 +43717,7 @@
           <a:p>
             <a:fld id="{F41C90BC-BB19-D143-A85E-83FF99B72C97}" type="datetime1">
               <a:rPr lang="en-US" smtClean="0"/>
-              <a:t>11/5/19</a:t>
+              <a:t>11/9/19</a:t>
             </a:fld>
             <a:endParaRPr lang="en-US" dirty="0"/>
           </a:p>
@@ -43851,7 +43906,7 @@
           <a:p>
             <a:fld id="{1CEEBB15-87C1-2448-899B-1A68CDC6588A}" type="datetime1">
               <a:rPr lang="en-US" smtClean="0"/>
-              <a:t>11/5/19</a:t>
+              <a:t>11/9/19</a:t>
             </a:fld>
             <a:endParaRPr lang="en-US" dirty="0"/>
           </a:p>
@@ -44054,7 +44109,7 @@
           <a:p>
             <a:fld id="{F41C90BC-BB19-D143-A85E-83FF99B72C97}" type="datetime1">
               <a:rPr lang="en-US" smtClean="0"/>
-              <a:t>11/5/19</a:t>
+              <a:t>11/9/19</a:t>
             </a:fld>
             <a:endParaRPr lang="en-US" dirty="0"/>
           </a:p>
@@ -44284,7 +44339,7 @@
           <a:p>
             <a:fld id="{F41C90BC-BB19-D143-A85E-83FF99B72C97}" type="datetime1">
               <a:rPr lang="en-US" smtClean="0"/>
-              <a:t>11/5/19</a:t>
+              <a:t>11/9/19</a:t>
             </a:fld>
             <a:endParaRPr lang="en-US" dirty="0"/>
           </a:p>
@@ -44505,7 +44560,7 @@
           <a:p>
             <a:fld id="{F41C90BC-BB19-D143-A85E-83FF99B72C97}" type="datetime1">
               <a:rPr lang="en-US" smtClean="0"/>
-              <a:t>11/5/19</a:t>
+              <a:t>11/9/19</a:t>
             </a:fld>
             <a:endParaRPr lang="en-US" dirty="0"/>
           </a:p>
@@ -44796,7 +44851,7 @@
           <a:p>
             <a:fld id="{F41C90BC-BB19-D143-A85E-83FF99B72C97}" type="datetime1">
               <a:rPr lang="en-US" smtClean="0"/>
-              <a:t>11/5/19</a:t>
+              <a:t>11/9/19</a:t>
             </a:fld>
             <a:endParaRPr lang="en-US" dirty="0"/>
           </a:p>
@@ -45040,7 +45095,7 @@
           <a:p>
             <a:fld id="{F41C90BC-BB19-D143-A85E-83FF99B72C97}" type="datetime1">
               <a:rPr lang="en-US" smtClean="0"/>
-              <a:t>11/5/19</a:t>
+              <a:t>11/9/19</a:t>
             </a:fld>
             <a:endParaRPr lang="en-US" dirty="0"/>
           </a:p>
@@ -45210,7 +45265,7 @@
           <a:p>
             <a:fld id="{D8CFB387-4E35-DD48-898A-F982CA0031A4}" type="datetime1">
               <a:rPr lang="en-US" smtClean="0"/>
-              <a:t>11/5/19</a:t>
+              <a:t>11/9/19</a:t>
             </a:fld>
             <a:endParaRPr lang="en-US" dirty="0"/>
           </a:p>
@@ -45410,7 +45465,7 @@
           <a:p>
             <a:fld id="{F41C90BC-BB19-D143-A85E-83FF99B72C97}" type="datetime1">
               <a:rPr lang="en-US" smtClean="0"/>
-              <a:t>11/5/19</a:t>
+              <a:t>11/9/19</a:t>
             </a:fld>
             <a:endParaRPr lang="en-US" dirty="0"/>
           </a:p>
@@ -45675,7 +45730,7 @@
           <a:p>
             <a:fld id="{F41C90BC-BB19-D143-A85E-83FF99B72C97}" type="datetime1">
               <a:rPr lang="en-US" smtClean="0"/>
-              <a:t>11/5/19</a:t>
+              <a:t>11/9/19</a:t>
             </a:fld>
             <a:endParaRPr lang="en-US" dirty="0"/>
           </a:p>
@@ -45888,7 +45943,7 @@
           <a:p>
             <a:fld id="{F41C90BC-BB19-D143-A85E-83FF99B72C97}" type="datetime1">
               <a:rPr lang="en-US" smtClean="0"/>
-              <a:t>11/5/19</a:t>
+              <a:t>11/9/19</a:t>
             </a:fld>
             <a:endParaRPr lang="en-US" dirty="0"/>
           </a:p>
@@ -46058,7 +46113,7 @@
           <a:p>
             <a:fld id="{D8CFB387-4E35-DD48-898A-F982CA0031A4}" type="datetime1">
               <a:rPr lang="en-US" smtClean="0"/>
-              <a:t>11/5/19</a:t>
+              <a:t>11/9/19</a:t>
             </a:fld>
             <a:endParaRPr lang="en-US" dirty="0"/>
           </a:p>
@@ -46228,7 +46283,7 @@
           <a:p>
             <a:fld id="{3A932169-D07D-A947-A8E7-E8D440DD19A1}" type="datetime1">
               <a:rPr lang="en-US" smtClean="0"/>
-              <a:t>11/5/19</a:t>
+              <a:t>11/9/19</a:t>
             </a:fld>
             <a:endParaRPr lang="en-US" dirty="0"/>
           </a:p>
@@ -46508,7 +46563,7 @@
           <a:p>
             <a:fld id="{F41C90BC-BB19-D143-A85E-83FF99B72C97}" type="datetime1">
               <a:rPr lang="en-US" smtClean="0"/>
-              <a:t>11/5/19</a:t>
+              <a:t>11/9/19</a:t>
             </a:fld>
             <a:endParaRPr lang="en-US" dirty="0"/>
           </a:p>
@@ -46960,7 +47015,7 @@
           <a:p>
             <a:fld id="{F41C90BC-BB19-D143-A85E-83FF99B72C97}" type="datetime1">
               <a:rPr lang="en-US" smtClean="0"/>
-              <a:t>11/5/19</a:t>
+              <a:t>11/9/19</a:t>
             </a:fld>
             <a:endParaRPr lang="en-US" dirty="0"/>
           </a:p>
@@ -47574,7 +47629,7 @@
           <a:p>
             <a:fld id="{F41C90BC-BB19-D143-A85E-83FF99B72C97}" type="datetime1">
               <a:rPr lang="en-US" smtClean="0"/>
-              <a:t>11/5/19</a:t>
+              <a:t>11/9/19</a:t>
             </a:fld>
             <a:endParaRPr lang="en-US" dirty="0"/>
           </a:p>
@@ -48186,7 +48241,7 @@
           <a:p>
             <a:fld id="{F41C90BC-BB19-D143-A85E-83FF99B72C97}" type="datetime1">
               <a:rPr lang="en-US" smtClean="0"/>
-              <a:t>11/5/19</a:t>
+              <a:t>11/9/19</a:t>
             </a:fld>
             <a:endParaRPr lang="en-US" dirty="0"/>
           </a:p>
@@ -48402,7 +48457,7 @@
           <a:p>
             <a:fld id="{F41C90BC-BB19-D143-A85E-83FF99B72C97}" type="datetime1">
               <a:rPr lang="en-US" smtClean="0"/>
-              <a:t>11/5/19</a:t>
+              <a:t>11/9/19</a:t>
             </a:fld>
             <a:endParaRPr lang="en-US" dirty="0"/>
           </a:p>
@@ -48607,7 +48662,7 @@
           <a:p>
             <a:fld id="{F41C90BC-BB19-D143-A85E-83FF99B72C97}" type="datetime1">
               <a:rPr lang="en-US" smtClean="0"/>
-              <a:t>11/5/19</a:t>
+              <a:t>11/9/19</a:t>
             </a:fld>
             <a:endParaRPr lang="en-US" dirty="0"/>
           </a:p>
@@ -48796,7 +48851,7 @@
           <a:p>
             <a:fld id="{F41C90BC-BB19-D143-A85E-83FF99B72C97}" type="datetime1">
               <a:rPr lang="en-US" smtClean="0"/>
-              <a:t>11/5/19</a:t>
+              <a:t>11/9/19</a:t>
             </a:fld>
             <a:endParaRPr lang="en-US" dirty="0"/>
           </a:p>
@@ -49002,7 +49057,7 @@
           <a:p>
             <a:fld id="{F41C90BC-BB19-D143-A85E-83FF99B72C97}" type="datetime1">
               <a:rPr lang="en-US" smtClean="0"/>
-              <a:t>11/5/19</a:t>
+              <a:t>11/9/19</a:t>
             </a:fld>
             <a:endParaRPr lang="en-US" dirty="0"/>
           </a:p>
@@ -49230,7 +49285,7 @@
           <a:p>
             <a:fld id="{F41C90BC-BB19-D143-A85E-83FF99B72C97}" type="datetime1">
               <a:rPr lang="en-US" smtClean="0"/>
-              <a:t>11/5/19</a:t>
+              <a:t>11/9/19</a:t>
             </a:fld>
             <a:endParaRPr lang="en-US" dirty="0"/>
           </a:p>
@@ -49400,7 +49455,7 @@
           <a:p>
             <a:fld id="{F41C90BC-BB19-D143-A85E-83FF99B72C97}" type="datetime1">
               <a:rPr lang="en-US" smtClean="0"/>
-              <a:t>11/5/19</a:t>
+              <a:t>11/9/19</a:t>
             </a:fld>
             <a:endParaRPr lang="en-US" dirty="0"/>
           </a:p>

</xml_diff>